<commit_message>
Prezentacija un diagrammas ir pabeigtas
</commit_message>
<xml_diff>
--- a/prezentacija un uml/Kraine_Sazarojuma-konstrukcijas.pptx
+++ b/prezentacija un uml/Kraine_Sazarojuma-konstrukcijas.pptx
@@ -5,36 +5,44 @@
     <p:sldMasterId id="2147483665" r:id="rId1"/>
   </p:sldMasterIdLst>
   <p:notesMasterIdLst>
-    <p:notesMasterId r:id="rId12"/>
+    <p:notesMasterId r:id="rId15"/>
   </p:notesMasterIdLst>
   <p:sldIdLst>
     <p:sldId id="256" r:id="rId2"/>
-    <p:sldId id="264" r:id="rId3"/>
-    <p:sldId id="277" r:id="rId4"/>
-    <p:sldId id="261" r:id="rId5"/>
-    <p:sldId id="276" r:id="rId6"/>
-    <p:sldId id="278" r:id="rId7"/>
-    <p:sldId id="279" r:id="rId8"/>
-    <p:sldId id="280" r:id="rId9"/>
-    <p:sldId id="281" r:id="rId10"/>
-    <p:sldId id="274" r:id="rId11"/>
+    <p:sldId id="282" r:id="rId3"/>
+    <p:sldId id="264" r:id="rId4"/>
+    <p:sldId id="277" r:id="rId5"/>
+    <p:sldId id="261" r:id="rId6"/>
+    <p:sldId id="276" r:id="rId7"/>
+    <p:sldId id="278" r:id="rId8"/>
+    <p:sldId id="279" r:id="rId9"/>
+    <p:sldId id="280" r:id="rId10"/>
+    <p:sldId id="281" r:id="rId11"/>
+    <p:sldId id="274" r:id="rId12"/>
+    <p:sldId id="283" r:id="rId13"/>
+    <p:sldId id="284" r:id="rId14"/>
   </p:sldIdLst>
   <p:sldSz cx="12192000" cy="6858000"/>
   <p:notesSz cx="6858000" cy="9144000"/>
   <p:embeddedFontLst>
     <p:embeddedFont>
-      <p:font typeface="Calibri" panose="020F0502020204030204" pitchFamily="34" charset="0"/>
-      <p:regular r:id="rId13"/>
-      <p:bold r:id="rId14"/>
-      <p:italic r:id="rId15"/>
-      <p:boldItalic r:id="rId16"/>
+      <p:font typeface="Ubuntu" panose="020B0604020202020204" charset="0"/>
+      <p:regular r:id="rId16"/>
+      <p:bold r:id="rId17"/>
+      <p:italic r:id="rId18"/>
+      <p:boldItalic r:id="rId19"/>
     </p:embeddedFont>
     <p:embeddedFont>
-      <p:font typeface="Ubuntu" panose="020B0504030602030204" pitchFamily="34" charset="0"/>
-      <p:regular r:id="rId17"/>
-      <p:bold r:id="rId18"/>
-      <p:italic r:id="rId19"/>
-      <p:boldItalic r:id="rId20"/>
+      <p:font typeface="Calibri" panose="020F0502020204030204" pitchFamily="34" charset="0"/>
+      <p:regular r:id="rId20"/>
+      <p:bold r:id="rId21"/>
+      <p:italic r:id="rId22"/>
+      <p:boldItalic r:id="rId23"/>
+    </p:embeddedFont>
+    <p:embeddedFont>
+      <p:font typeface="Bahnschrift" panose="020B0502040204020203" pitchFamily="34" charset="0"/>
+      <p:regular r:id="rId24"/>
+      <p:bold r:id="rId25"/>
     </p:embeddedFont>
   </p:embeddedFontLst>
   <p:defaultTextStyle>
@@ -23204,13 +23212,19 @@
               <a:buNone/>
             </a:pPr>
             <a:r>
-              <a:rPr lang="lv-LV" dirty="0">
-                <a:latin typeface="+mn-lt"/>
+              <a:rPr lang="lv-LV" sz="2400" dirty="0">
+                <a:latin typeface="Bahnschrift" panose="020B0502040204020203" pitchFamily="34" charset="0"/>
               </a:rPr>
-              <a:t>Elīna Kraine</a:t>
+              <a:t>Elīna </a:t>
             </a:r>
-            <a:endParaRPr dirty="0">
-              <a:latin typeface="+mn-lt"/>
+            <a:r>
+              <a:rPr lang="lv-LV" sz="2400" dirty="0" smtClean="0">
+                <a:latin typeface="Bahnschrift" panose="020B0502040204020203" pitchFamily="34" charset="0"/>
+              </a:rPr>
+              <a:t>Kraine 2PT-2</a:t>
+            </a:r>
+            <a:endParaRPr sz="2400" dirty="0">
+              <a:latin typeface="Bahnschrift" panose="020B0502040204020203" pitchFamily="34" charset="0"/>
             </a:endParaRPr>
           </a:p>
         </p:txBody>
@@ -23243,54 +23257,54 @@
             <a:pPr lvl="0"/>
             <a:r>
               <a:rPr lang="en-US" sz="5400" b="1" dirty="0" err="1">
-                <a:latin typeface="+mj-lt"/>
+                <a:latin typeface="Bahnschrift" panose="020B0502040204020203" pitchFamily="34" charset="0"/>
               </a:rPr>
               <a:t>Sazarojuma</a:t>
             </a:r>
             <a:r>
               <a:rPr lang="en-US" sz="5400" b="1" dirty="0">
-                <a:latin typeface="+mj-lt"/>
+                <a:latin typeface="Bahnschrift" panose="020B0502040204020203" pitchFamily="34" charset="0"/>
               </a:rPr>
               <a:t> </a:t>
             </a:r>
             <a:r>
               <a:rPr lang="en-US" sz="5400" b="1" dirty="0" err="1">
-                <a:latin typeface="+mj-lt"/>
+                <a:latin typeface="Bahnschrift" panose="020B0502040204020203" pitchFamily="34" charset="0"/>
               </a:rPr>
               <a:t>konstrukcijas</a:t>
             </a:r>
             <a:r>
               <a:rPr lang="en-US" sz="5400" b="1" dirty="0">
-                <a:latin typeface="+mj-lt"/>
+                <a:latin typeface="Bahnschrift" panose="020B0502040204020203" pitchFamily="34" charset="0"/>
               </a:rPr>
               <a:t> </a:t>
             </a:r>
             <a:r>
               <a:rPr lang="en-US" sz="5400" b="1" dirty="0" err="1">
-                <a:latin typeface="+mj-lt"/>
+                <a:latin typeface="Bahnschrift" panose="020B0502040204020203" pitchFamily="34" charset="0"/>
               </a:rPr>
               <a:t>programmēšanas</a:t>
             </a:r>
             <a:r>
               <a:rPr lang="en-US" sz="5400" b="1" dirty="0">
-                <a:latin typeface="+mj-lt"/>
+                <a:latin typeface="Bahnschrift" panose="020B0502040204020203" pitchFamily="34" charset="0"/>
               </a:rPr>
               <a:t> </a:t>
             </a:r>
             <a:r>
               <a:rPr lang="en-US" sz="5400" b="1" dirty="0" err="1">
-                <a:latin typeface="+mj-lt"/>
+                <a:latin typeface="Bahnschrift" panose="020B0502040204020203" pitchFamily="34" charset="0"/>
               </a:rPr>
               <a:t>valodā</a:t>
             </a:r>
             <a:r>
               <a:rPr lang="en-US" sz="5400" b="1" dirty="0">
-                <a:latin typeface="+mj-lt"/>
+                <a:latin typeface="Bahnschrift" panose="020B0502040204020203" pitchFamily="34" charset="0"/>
               </a:rPr>
               <a:t> Java</a:t>
             </a:r>
             <a:endParaRPr sz="5400" b="1" dirty="0">
-              <a:latin typeface="+mj-lt"/>
+              <a:latin typeface="Bahnschrift" panose="020B0502040204020203" pitchFamily="34" charset="0"/>
             </a:endParaRPr>
           </a:p>
         </p:txBody>
@@ -23303,10 +23317,105 @@
   <p:transition spd="slow">
     <p:push dir="u"/>
   </p:transition>
+  <p:timing>
+    <p:tnLst>
+      <p:par>
+        <p:cTn id="1" dur="indefinite" restart="never" nodeType="tmRoot"/>
+      </p:par>
+    </p:tnLst>
+  </p:timing>
 </p:sld>
 </file>
 
 <file path=ppt/slides/slide10.xml><?xml version="1.0" encoding="utf-8"?>
+<p:sld xmlns:a="http://schemas.openxmlformats.org/drawingml/2006/main" xmlns:r="http://schemas.openxmlformats.org/officeDocument/2006/relationships" xmlns:p="http://schemas.openxmlformats.org/presentationml/2006/main">
+  <p:cSld>
+    <p:spTree>
+      <p:nvGrpSpPr>
+        <p:cNvPr id="1" name="Shape 692"/>
+        <p:cNvGrpSpPr/>
+        <p:nvPr/>
+      </p:nvGrpSpPr>
+      <p:grpSpPr>
+        <a:xfrm>
+          <a:off x="0" y="0"/>
+          <a:ext cx="0" cy="0"/>
+          <a:chOff x="0" y="0"/>
+          <a:chExt cx="0" cy="0"/>
+        </a:xfrm>
+      </p:grpSpPr>
+      <p:pic>
+        <p:nvPicPr>
+          <p:cNvPr id="2" name="Рисунок 1"/>
+          <p:cNvPicPr>
+            <a:picLocks noChangeAspect="1"/>
+          </p:cNvPicPr>
+          <p:nvPr/>
+        </p:nvPicPr>
+        <p:blipFill>
+          <a:blip r:embed="rId3"/>
+          <a:stretch>
+            <a:fillRect/>
+          </a:stretch>
+        </p:blipFill>
+        <p:spPr>
+          <a:xfrm>
+            <a:off x="581890" y="901750"/>
+            <a:ext cx="7863701" cy="5360505"/>
+          </a:xfrm>
+          <a:prstGeom prst="rect">
+            <a:avLst/>
+          </a:prstGeom>
+        </p:spPr>
+      </p:pic>
+      <p:pic>
+        <p:nvPicPr>
+          <p:cNvPr id="3" name="Рисунок 2"/>
+          <p:cNvPicPr>
+            <a:picLocks noChangeAspect="1"/>
+          </p:cNvPicPr>
+          <p:nvPr/>
+        </p:nvPicPr>
+        <p:blipFill>
+          <a:blip r:embed="rId4"/>
+          <a:stretch>
+            <a:fillRect/>
+          </a:stretch>
+        </p:blipFill>
+        <p:spPr>
+          <a:xfrm>
+            <a:off x="8543343" y="3114690"/>
+            <a:ext cx="3285784" cy="934623"/>
+          </a:xfrm>
+          <a:prstGeom prst="rect">
+            <a:avLst/>
+          </a:prstGeom>
+        </p:spPr>
+      </p:pic>
+    </p:spTree>
+    <p:extLst>
+      <p:ext uri="{BB962C8B-B14F-4D97-AF65-F5344CB8AC3E}">
+        <p14:creationId xmlns:p14="http://schemas.microsoft.com/office/powerpoint/2010/main" val="2874742192"/>
+      </p:ext>
+    </p:extLst>
+  </p:cSld>
+  <p:clrMapOvr>
+    <a:masterClrMapping/>
+  </p:clrMapOvr>
+  <p:transition spd="slow">
+    <p:push dir="u"/>
+  </p:transition>
+  <p:timing>
+    <p:tnLst>
+      <p:par>
+        <p:cTn id="1" dur="indefinite" restart="never" nodeType="tmRoot"/>
+      </p:par>
+    </p:tnLst>
+  </p:timing>
+</p:sld>
+</file>
+
+<file path=ppt/slides/slide11.xml><?xml version="1.0" encoding="utf-8"?>
 <p:sld xmlns:a="http://schemas.openxmlformats.org/drawingml/2006/main" xmlns:r="http://schemas.openxmlformats.org/officeDocument/2006/relationships" xmlns:p="http://schemas.openxmlformats.org/presentationml/2006/main">
   <p:cSld>
     <p:spTree>
@@ -23378,7 +23487,7 @@
         <p:spPr>
           <a:xfrm>
             <a:off x="789709" y="1454728"/>
-            <a:ext cx="9740386" cy="2862322"/>
+            <a:ext cx="10709564" cy="3170099"/>
           </a:xfrm>
           <a:prstGeom prst="rect">
             <a:avLst/>
@@ -23442,17 +23551,58 @@
                   <a:schemeClr val="bg2"/>
                 </a:solidFill>
                 <a:latin typeface="+mn-lt"/>
-                <a:hlinkClick r:id="rId3">
-                  <a:extLst>
-                    <a:ext uri="{A12FA001-AC4F-418D-AE19-62706E023703}">
-                      <ahyp:hlinkClr xmlns:ahyp="http://schemas.microsoft.com/office/drawing/2018/hyperlinkcolor" val="tx"/>
-                    </a:ext>
-                  </a:extLst>
-                </a:hlinkClick>
+                <a:hlinkClick r:id="rId3"/>
               </a:rPr>
-              <a:t>https://javarush.com/groups/posts/2726-vetvlenie-v-java</a:t>
+              <a:t>https://</a:t>
             </a:r>
-            <a:endParaRPr lang="en-US" sz="2000">
+            <a:r>
+              <a:rPr lang="en-US" sz="2000" dirty="0" smtClean="0">
+                <a:solidFill>
+                  <a:schemeClr val="bg2"/>
+                </a:solidFill>
+                <a:latin typeface="+mn-lt"/>
+                <a:hlinkClick r:id="rId3"/>
+              </a:rPr>
+              <a:t>javarush.com/groups/posts/2726-vetvlenie-v-java</a:t>
+            </a:r>
+            <a:endParaRPr lang="lv-LV" sz="2000" dirty="0" smtClean="0">
+              <a:solidFill>
+                <a:schemeClr val="bg2"/>
+              </a:solidFill>
+              <a:latin typeface="+mn-lt"/>
+            </a:endParaRPr>
+          </a:p>
+          <a:p>
+            <a:r>
+              <a:rPr lang="en-US" sz="2000" dirty="0">
+                <a:solidFill>
+                  <a:schemeClr val="bg2"/>
+                </a:solidFill>
+                <a:latin typeface="+mn-lt"/>
+                <a:hlinkClick r:id="rId4"/>
+              </a:rPr>
+              <a:t>https://</a:t>
+            </a:r>
+            <a:r>
+              <a:rPr lang="en-US" sz="2000" dirty="0" smtClean="0">
+                <a:solidFill>
+                  <a:schemeClr val="bg2"/>
+                </a:solidFill>
+                <a:latin typeface="+mn-lt"/>
+                <a:hlinkClick r:id="rId4"/>
+              </a:rPr>
+              <a:t>likta.lv/wp-content/uploads/2018/12/Programmesanas_gramata_e-versija.pdf</a:t>
+            </a:r>
+            <a:r>
+              <a:rPr lang="lv-LV" sz="2000" dirty="0" smtClean="0">
+                <a:solidFill>
+                  <a:schemeClr val="bg2"/>
+                </a:solidFill>
+                <a:latin typeface="+mn-lt"/>
+              </a:rPr>
+              <a:t> </a:t>
+            </a:r>
+            <a:endParaRPr lang="en-US" sz="2000" dirty="0">
               <a:solidFill>
                 <a:schemeClr val="bg2"/>
               </a:solidFill>
@@ -23469,7 +23619,7 @@
           </a:p>
           <a:p>
             <a:r>
-              <a:rPr lang="en-US" sz="2000" b="1" err="1">
+              <a:rPr lang="en-US" sz="2000" b="1" dirty="0" err="1">
                 <a:solidFill>
                   <a:schemeClr val="bg2"/>
                 </a:solidFill>
@@ -23494,24 +23644,24 @@
                   <a:schemeClr val="bg2"/>
                 </a:solidFill>
                 <a:latin typeface="+mn-lt"/>
-                <a:hlinkClick r:id="rId4">
+                <a:hlinkClick r:id="rId5">
                   <a:extLst>
                     <a:ext uri="{A12FA001-AC4F-418D-AE19-62706E023703}">
-                      <ahyp:hlinkClr xmlns:ahyp="http://schemas.microsoft.com/office/drawing/2018/hyperlinkcolor" val="tx"/>
+                      <ahyp:hlinkClr xmlns:ahyp="http://schemas.microsoft.com/office/drawing/2018/hyperlinkcolor" xmlns="" val="tx"/>
                     </a:ext>
                   </a:extLst>
                 </a:hlinkClick>
               </a:rPr>
               <a:t>Create read-only (non-editable) JTextField - Examples Java Code Geeks - 2023 </a:t>
             </a:r>
-            <a:endParaRPr lang="en-US">
+            <a:endParaRPr lang="en-US" dirty="0">
               <a:solidFill>
                 <a:schemeClr val="bg2"/>
               </a:solidFill>
-              <a:hlinkClick r:id="rId4">
+              <a:hlinkClick r:id="rId5">
                 <a:extLst>
                   <a:ext uri="{A12FA001-AC4F-418D-AE19-62706E023703}">
-                    <ahyp:hlinkClr xmlns:ahyp="http://schemas.microsoft.com/office/drawing/2018/hyperlinkcolor" val="tx"/>
+                    <ahyp:hlinkClr xmlns:ahyp="http://schemas.microsoft.com/office/drawing/2018/hyperlinkcolor" xmlns="" val="tx"/>
                   </a:ext>
                 </a:extLst>
               </a:hlinkClick>
@@ -23524,17 +23674,17 @@
                   <a:schemeClr val="bg2"/>
                 </a:solidFill>
                 <a:latin typeface="+mn-lt"/>
-                <a:hlinkClick r:id="rId5">
+                <a:hlinkClick r:id="rId6">
                   <a:extLst>
                     <a:ext uri="{A12FA001-AC4F-418D-AE19-62706E023703}">
-                      <ahyp:hlinkClr xmlns:ahyp="http://schemas.microsoft.com/office/drawing/2018/hyperlinkcolor" val="tx"/>
+                      <ahyp:hlinkClr xmlns:ahyp="http://schemas.microsoft.com/office/drawing/2018/hyperlinkcolor" xmlns="" val="tx"/>
                     </a:ext>
                   </a:extLst>
                 </a:hlinkClick>
               </a:rPr>
               <a:t>https://www.javatpoint.com/java-jbutton</a:t>
             </a:r>
-            <a:endParaRPr lang="lv-LV" sz="2000">
+            <a:endParaRPr lang="lv-LV" sz="2000" dirty="0">
               <a:solidFill>
                 <a:schemeClr val="bg2"/>
               </a:solidFill>
@@ -23568,10 +23718,787 @@
   <p:transition spd="slow">
     <p:push dir="u"/>
   </p:transition>
+  <p:timing>
+    <p:tnLst>
+      <p:par>
+        <p:cTn id="1" dur="indefinite" restart="never" nodeType="tmRoot"/>
+      </p:par>
+    </p:tnLst>
+  </p:timing>
+</p:sld>
+</file>
+
+<file path=ppt/slides/slide12.xml><?xml version="1.0" encoding="utf-8"?>
+<p:sld xmlns:a="http://schemas.openxmlformats.org/drawingml/2006/main" xmlns:r="http://schemas.openxmlformats.org/officeDocument/2006/relationships" xmlns:p="http://schemas.openxmlformats.org/presentationml/2006/main">
+  <p:cSld>
+    <p:spTree>
+      <p:nvGrpSpPr>
+        <p:cNvPr id="1" name=""/>
+        <p:cNvGrpSpPr/>
+        <p:nvPr/>
+      </p:nvGrpSpPr>
+      <p:grpSpPr>
+        <a:xfrm>
+          <a:off x="0" y="0"/>
+          <a:ext cx="0" cy="0"/>
+          <a:chOff x="0" y="0"/>
+          <a:chExt cx="0" cy="0"/>
+        </a:xfrm>
+      </p:grpSpPr>
+      <p:pic>
+        <p:nvPicPr>
+          <p:cNvPr id="4" name="Рисунок 3"/>
+          <p:cNvPicPr>
+            <a:picLocks noChangeAspect="1"/>
+          </p:cNvPicPr>
+          <p:nvPr/>
+        </p:nvPicPr>
+        <p:blipFill>
+          <a:blip r:embed="rId2">
+            <a:extLst>
+              <a:ext uri="{28A0092B-C50C-407E-A947-70E740481C1C}">
+                <a14:useLocalDpi xmlns:a14="http://schemas.microsoft.com/office/drawing/2010/main" val="0"/>
+              </a:ext>
+            </a:extLst>
+          </a:blip>
+          <a:stretch>
+            <a:fillRect/>
+          </a:stretch>
+        </p:blipFill>
+        <p:spPr>
+          <a:xfrm>
+            <a:off x="724704" y="1731819"/>
+            <a:ext cx="10869463" cy="3602181"/>
+          </a:xfrm>
+          <a:prstGeom prst="rect">
+            <a:avLst/>
+          </a:prstGeom>
+        </p:spPr>
+      </p:pic>
+    </p:spTree>
+    <p:extLst>
+      <p:ext uri="{BB962C8B-B14F-4D97-AF65-F5344CB8AC3E}">
+        <p14:creationId xmlns:p14="http://schemas.microsoft.com/office/powerpoint/2010/main" val="1928279099"/>
+      </p:ext>
+    </p:extLst>
+  </p:cSld>
+  <p:clrMapOvr>
+    <a:masterClrMapping/>
+  </p:clrMapOvr>
+  <p:transition spd="slow">
+    <p:push dir="u"/>
+  </p:transition>
+  <p:timing>
+    <p:tnLst>
+      <p:par>
+        <p:cTn id="1" dur="indefinite" restart="never" nodeType="tmRoot"/>
+      </p:par>
+    </p:tnLst>
+  </p:timing>
+</p:sld>
+</file>
+
+<file path=ppt/slides/slide13.xml><?xml version="1.0" encoding="utf-8"?>
+<p:sld xmlns:a="http://schemas.openxmlformats.org/drawingml/2006/main" xmlns:r="http://schemas.openxmlformats.org/officeDocument/2006/relationships" xmlns:p="http://schemas.openxmlformats.org/presentationml/2006/main">
+  <p:cSld>
+    <p:spTree>
+      <p:nvGrpSpPr>
+        <p:cNvPr id="1" name=""/>
+        <p:cNvGrpSpPr/>
+        <p:nvPr/>
+      </p:nvGrpSpPr>
+      <p:grpSpPr>
+        <a:xfrm>
+          <a:off x="0" y="0"/>
+          <a:ext cx="0" cy="0"/>
+          <a:chOff x="0" y="0"/>
+          <a:chExt cx="0" cy="0"/>
+        </a:xfrm>
+      </p:grpSpPr>
+      <p:pic>
+        <p:nvPicPr>
+          <p:cNvPr id="3" name="Рисунок 2"/>
+          <p:cNvPicPr>
+            <a:picLocks noChangeAspect="1"/>
+          </p:cNvPicPr>
+          <p:nvPr/>
+        </p:nvPicPr>
+        <p:blipFill>
+          <a:blip r:embed="rId2">
+            <a:extLst>
+              <a:ext uri="{28A0092B-C50C-407E-A947-70E740481C1C}">
+                <a14:useLocalDpi xmlns:a14="http://schemas.microsoft.com/office/drawing/2010/main" val="0"/>
+              </a:ext>
+            </a:extLst>
+          </a:blip>
+          <a:stretch>
+            <a:fillRect/>
+          </a:stretch>
+        </p:blipFill>
+        <p:spPr>
+          <a:xfrm>
+            <a:off x="501070" y="2493818"/>
+            <a:ext cx="11178312" cy="1577483"/>
+          </a:xfrm>
+          <a:prstGeom prst="rect">
+            <a:avLst/>
+          </a:prstGeom>
+        </p:spPr>
+      </p:pic>
+    </p:spTree>
+    <p:extLst>
+      <p:ext uri="{BB962C8B-B14F-4D97-AF65-F5344CB8AC3E}">
+        <p14:creationId xmlns:p14="http://schemas.microsoft.com/office/powerpoint/2010/main" val="777840235"/>
+      </p:ext>
+    </p:extLst>
+  </p:cSld>
+  <p:clrMapOvr>
+    <a:masterClrMapping/>
+  </p:clrMapOvr>
+  <p:transition spd="slow">
+    <p:push dir="u"/>
+  </p:transition>
+  <p:timing>
+    <p:tnLst>
+      <p:par>
+        <p:cTn id="1" dur="indefinite" restart="never" nodeType="tmRoot"/>
+      </p:par>
+    </p:tnLst>
+  </p:timing>
 </p:sld>
 </file>
 
 <file path=ppt/slides/slide2.xml><?xml version="1.0" encoding="utf-8"?>
+<p:sld xmlns:a="http://schemas.openxmlformats.org/drawingml/2006/main" xmlns:r="http://schemas.openxmlformats.org/officeDocument/2006/relationships" xmlns:p="http://schemas.openxmlformats.org/presentationml/2006/main">
+  <p:cSld>
+    <p:spTree>
+      <p:nvGrpSpPr>
+        <p:cNvPr id="1" name=""/>
+        <p:cNvGrpSpPr/>
+        <p:nvPr/>
+      </p:nvGrpSpPr>
+      <p:grpSpPr>
+        <a:xfrm>
+          <a:off x="0" y="0"/>
+          <a:ext cx="0" cy="0"/>
+          <a:chOff x="0" y="0"/>
+          <a:chExt cx="0" cy="0"/>
+        </a:xfrm>
+      </p:grpSpPr>
+      <p:pic>
+        <p:nvPicPr>
+          <p:cNvPr id="1026" name="Picture 2" descr="Best Casino for Real Money: Top 10 Real Money Online Casinos in 2023"/>
+          <p:cNvPicPr>
+            <a:picLocks noChangeAspect="1" noChangeArrowheads="1"/>
+          </p:cNvPicPr>
+          <p:nvPr/>
+        </p:nvPicPr>
+        <p:blipFill>
+          <a:blip r:embed="rId2">
+            <a:extLst>
+              <a:ext uri="{28A0092B-C50C-407E-A947-70E740481C1C}">
+                <a14:useLocalDpi xmlns:a14="http://schemas.microsoft.com/office/drawing/2010/main" val="0"/>
+              </a:ext>
+            </a:extLst>
+          </a:blip>
+          <a:srcRect/>
+          <a:stretch>
+            <a:fillRect/>
+          </a:stretch>
+        </p:blipFill>
+        <p:spPr bwMode="auto">
+          <a:xfrm>
+            <a:off x="2258291" y="2092035"/>
+            <a:ext cx="7620000" cy="3810000"/>
+          </a:xfrm>
+          <a:prstGeom prst="rect">
+            <a:avLst/>
+          </a:prstGeom>
+          <a:noFill/>
+          <a:extLst>
+            <a:ext uri="{909E8E84-426E-40DD-AFC4-6F175D3DCCD1}">
+              <a14:hiddenFill xmlns:a14="http://schemas.microsoft.com/office/drawing/2010/main">
+                <a:solidFill>
+                  <a:srgbClr val="FFFFFF"/>
+                </a:solidFill>
+              </a14:hiddenFill>
+            </a:ext>
+          </a:extLst>
+        </p:spPr>
+      </p:pic>
+      <p:pic>
+        <p:nvPicPr>
+          <p:cNvPr id="1028" name="Picture 4" descr="Warning PNGs for Free Download"/>
+          <p:cNvPicPr>
+            <a:picLocks noChangeAspect="1" noChangeArrowheads="1"/>
+          </p:cNvPicPr>
+          <p:nvPr/>
+        </p:nvPicPr>
+        <p:blipFill>
+          <a:blip r:embed="rId3">
+            <a:extLst>
+              <a:ext uri="{28A0092B-C50C-407E-A947-70E740481C1C}">
+                <a14:useLocalDpi xmlns:a14="http://schemas.microsoft.com/office/drawing/2010/main" val="0"/>
+              </a:ext>
+            </a:extLst>
+          </a:blip>
+          <a:srcRect/>
+          <a:stretch>
+            <a:fillRect/>
+          </a:stretch>
+        </p:blipFill>
+        <p:spPr bwMode="auto">
+          <a:xfrm>
+            <a:off x="4548402" y="2477147"/>
+            <a:ext cx="3039773" cy="3039773"/>
+          </a:xfrm>
+          <a:prstGeom prst="rect">
+            <a:avLst/>
+          </a:prstGeom>
+          <a:noFill/>
+          <a:extLst>
+            <a:ext uri="{909E8E84-426E-40DD-AFC4-6F175D3DCCD1}">
+              <a14:hiddenFill xmlns:a14="http://schemas.microsoft.com/office/drawing/2010/main">
+                <a:solidFill>
+                  <a:srgbClr val="FFFFFF"/>
+                </a:solidFill>
+              </a14:hiddenFill>
+            </a:ext>
+          </a:extLst>
+        </p:spPr>
+      </p:pic>
+      <p:pic>
+        <p:nvPicPr>
+          <p:cNvPr id="1030" name="Picture 6" descr="Thumbs Up And Thumb Down Icon Set Thumb Up And Thumb Down Line Icons Flat  Style Stock Vector Stock Illustration - Download Image Now - iStock"/>
+          <p:cNvPicPr>
+            <a:picLocks noChangeAspect="1" noChangeArrowheads="1"/>
+          </p:cNvPicPr>
+          <p:nvPr/>
+        </p:nvPicPr>
+        <p:blipFill rotWithShape="1">
+          <a:blip r:embed="rId4">
+            <a:extLst>
+              <a:ext uri="{28A0092B-C50C-407E-A947-70E740481C1C}">
+                <a14:useLocalDpi xmlns:a14="http://schemas.microsoft.com/office/drawing/2010/main" val="0"/>
+              </a:ext>
+            </a:extLst>
+          </a:blip>
+          <a:srcRect t="17113" b="17290"/>
+          <a:stretch/>
+        </p:blipFill>
+        <p:spPr bwMode="auto">
+          <a:xfrm>
+            <a:off x="2801926" y="2477147"/>
+            <a:ext cx="6532723" cy="2856853"/>
+          </a:xfrm>
+          <a:prstGeom prst="rect">
+            <a:avLst/>
+          </a:prstGeom>
+          <a:noFill/>
+          <a:extLst>
+            <a:ext uri="{909E8E84-426E-40DD-AFC4-6F175D3DCCD1}">
+              <a14:hiddenFill xmlns:a14="http://schemas.microsoft.com/office/drawing/2010/main">
+                <a:solidFill>
+                  <a:srgbClr val="FFFFFF"/>
+                </a:solidFill>
+              </a14:hiddenFill>
+            </a:ext>
+          </a:extLst>
+        </p:spPr>
+      </p:pic>
+      <p:sp>
+        <p:nvSpPr>
+          <p:cNvPr id="3" name="Прямоугольник 2"/>
+          <p:cNvSpPr/>
+          <p:nvPr/>
+        </p:nvSpPr>
+        <p:spPr>
+          <a:xfrm>
+            <a:off x="4315689" y="3283525"/>
+            <a:ext cx="3505201" cy="1427019"/>
+          </a:xfrm>
+          <a:prstGeom prst="rect">
+            <a:avLst/>
+          </a:prstGeom>
+        </p:spPr>
+        <p:style>
+          <a:lnRef idx="2">
+            <a:schemeClr val="accent6"/>
+          </a:lnRef>
+          <a:fillRef idx="1">
+            <a:schemeClr val="lt1"/>
+          </a:fillRef>
+          <a:effectRef idx="0">
+            <a:schemeClr val="accent6"/>
+          </a:effectRef>
+          <a:fontRef idx="minor">
+            <a:schemeClr val="dk1"/>
+          </a:fontRef>
+        </p:style>
+        <p:txBody>
+          <a:bodyPr rtlCol="0" anchor="ctr"/>
+          <a:lstStyle/>
+          <a:p>
+            <a:pPr algn="ctr"/>
+            <a:r>
+              <a:rPr lang="lv-LV" sz="2800" dirty="0" smtClean="0"/>
+              <a:t>Ievadi vecumu:</a:t>
+            </a:r>
+          </a:p>
+          <a:p>
+            <a:pPr algn="ctr"/>
+            <a:r>
+              <a:rPr lang="lv-LV" sz="2800" dirty="0" smtClean="0"/>
+              <a:t>__________</a:t>
+            </a:r>
+            <a:endParaRPr lang="ru-RU" sz="2800" dirty="0"/>
+          </a:p>
+        </p:txBody>
+      </p:sp>
+      <p:sp>
+        <p:nvSpPr>
+          <p:cNvPr id="2" name="Заголовок 1"/>
+          <p:cNvSpPr>
+            <a:spLocks noGrp="1"/>
+          </p:cNvSpPr>
+          <p:nvPr>
+            <p:ph type="title"/>
+          </p:nvPr>
+        </p:nvSpPr>
+        <p:spPr>
+          <a:xfrm>
+            <a:off x="387939" y="3005234"/>
+            <a:ext cx="11360700" cy="991800"/>
+          </a:xfrm>
+        </p:spPr>
+        <p:txBody>
+          <a:bodyPr/>
+          <a:lstStyle/>
+          <a:p>
+            <a:r>
+              <a:rPr lang="lv-LV" dirty="0" smtClean="0">
+                <a:latin typeface="Bahnschrift" panose="020B0502040204020203" pitchFamily="34" charset="0"/>
+              </a:rPr>
+              <a:t>Sazarošana</a:t>
+            </a:r>
+            <a:endParaRPr lang="ru-RU" dirty="0">
+              <a:latin typeface="Bahnschrift" panose="020B0502040204020203" pitchFamily="34" charset="0"/>
+            </a:endParaRPr>
+          </a:p>
+        </p:txBody>
+      </p:sp>
+    </p:spTree>
+    <p:extLst>
+      <p:ext uri="{BB962C8B-B14F-4D97-AF65-F5344CB8AC3E}">
+        <p14:creationId xmlns:p14="http://schemas.microsoft.com/office/powerpoint/2010/main" val="546790812"/>
+      </p:ext>
+    </p:extLst>
+  </p:cSld>
+  <p:clrMapOvr>
+    <a:masterClrMapping/>
+  </p:clrMapOvr>
+  <p:transition spd="slow">
+    <p:push dir="u"/>
+  </p:transition>
+  <p:timing>
+    <p:tnLst>
+      <p:par>
+        <p:cTn id="1" dur="indefinite" restart="never" nodeType="tmRoot">
+          <p:childTnLst>
+            <p:seq concurrent="1" nextAc="seek">
+              <p:cTn id="2" dur="indefinite" nodeType="mainSeq">
+                <p:childTnLst>
+                  <p:par>
+                    <p:cTn id="3" fill="hold">
+                      <p:stCondLst>
+                        <p:cond delay="indefinite"/>
+                      </p:stCondLst>
+                      <p:childTnLst>
+                        <p:par>
+                          <p:cTn id="4" fill="hold">
+                            <p:stCondLst>
+                              <p:cond delay="0"/>
+                            </p:stCondLst>
+                            <p:childTnLst>
+                              <p:par>
+                                <p:cTn id="5" presetID="64" presetClass="path" presetSubtype="0" accel="50000" decel="50000" fill="hold" grpId="0" nodeType="clickEffect">
+                                  <p:stCondLst>
+                                    <p:cond delay="0"/>
+                                  </p:stCondLst>
+                                  <p:childTnLst>
+                                    <p:animMotion origin="layout" path="M 3.75E-6 3.33333E-6 L 0.00351 -0.35 " pathEditMode="relative" rAng="0" ptsTypes="AA">
+                                      <p:cBhvr>
+                                        <p:cTn id="6" dur="2000" fill="hold"/>
+                                        <p:tgtEl>
+                                          <p:spTgt spid="2"/>
+                                        </p:tgtEl>
+                                        <p:attrNameLst>
+                                          <p:attrName>ppt_x</p:attrName>
+                                          <p:attrName>ppt_y</p:attrName>
+                                        </p:attrNameLst>
+                                      </p:cBhvr>
+                                      <p:rCtr x="169" y="-17500"/>
+                                    </p:animMotion>
+                                  </p:childTnLst>
+                                </p:cTn>
+                              </p:par>
+                            </p:childTnLst>
+                          </p:cTn>
+                        </p:par>
+                        <p:par>
+                          <p:cTn id="7" fill="hold">
+                            <p:stCondLst>
+                              <p:cond delay="2000"/>
+                            </p:stCondLst>
+                            <p:childTnLst>
+                              <p:par>
+                                <p:cTn id="8" presetID="1" presetClass="entr" presetSubtype="0" fill="hold" nodeType="afterEffect">
+                                  <p:stCondLst>
+                                    <p:cond delay="0"/>
+                                  </p:stCondLst>
+                                  <p:childTnLst>
+                                    <p:set>
+                                      <p:cBhvr>
+                                        <p:cTn id="9" dur="1" fill="hold">
+                                          <p:stCondLst>
+                                            <p:cond delay="0"/>
+                                          </p:stCondLst>
+                                        </p:cTn>
+                                        <p:tgtEl>
+                                          <p:spTgt spid="1026"/>
+                                        </p:tgtEl>
+                                        <p:attrNameLst>
+                                          <p:attrName>style.visibility</p:attrName>
+                                        </p:attrNameLst>
+                                      </p:cBhvr>
+                                      <p:to>
+                                        <p:strVal val="visible"/>
+                                      </p:to>
+                                    </p:set>
+                                  </p:childTnLst>
+                                </p:cTn>
+                              </p:par>
+                            </p:childTnLst>
+                          </p:cTn>
+                        </p:par>
+                      </p:childTnLst>
+                    </p:cTn>
+                  </p:par>
+                  <p:par>
+                    <p:cTn id="10" fill="hold">
+                      <p:stCondLst>
+                        <p:cond delay="indefinite"/>
+                      </p:stCondLst>
+                      <p:childTnLst>
+                        <p:par>
+                          <p:cTn id="11" fill="hold">
+                            <p:stCondLst>
+                              <p:cond delay="0"/>
+                            </p:stCondLst>
+                            <p:childTnLst>
+                              <p:par>
+                                <p:cTn id="12" presetID="1" presetClass="entr" presetSubtype="0" fill="hold" nodeType="clickEffect">
+                                  <p:stCondLst>
+                                    <p:cond delay="0"/>
+                                  </p:stCondLst>
+                                  <p:childTnLst>
+                                    <p:set>
+                                      <p:cBhvr>
+                                        <p:cTn id="13" dur="1" fill="hold">
+                                          <p:stCondLst>
+                                            <p:cond delay="0"/>
+                                          </p:stCondLst>
+                                        </p:cTn>
+                                        <p:tgtEl>
+                                          <p:spTgt spid="1028"/>
+                                        </p:tgtEl>
+                                        <p:attrNameLst>
+                                          <p:attrName>style.visibility</p:attrName>
+                                        </p:attrNameLst>
+                                      </p:cBhvr>
+                                      <p:to>
+                                        <p:strVal val="visible"/>
+                                      </p:to>
+                                    </p:set>
+                                  </p:childTnLst>
+                                </p:cTn>
+                              </p:par>
+                            </p:childTnLst>
+                          </p:cTn>
+                        </p:par>
+                      </p:childTnLst>
+                    </p:cTn>
+                  </p:par>
+                  <p:par>
+                    <p:cTn id="14" fill="hold">
+                      <p:stCondLst>
+                        <p:cond delay="indefinite"/>
+                      </p:stCondLst>
+                      <p:childTnLst>
+                        <p:par>
+                          <p:cTn id="15" fill="hold">
+                            <p:stCondLst>
+                              <p:cond delay="0"/>
+                            </p:stCondLst>
+                            <p:childTnLst>
+                              <p:par>
+                                <p:cTn id="16" presetID="1" presetClass="entr" presetSubtype="0" fill="hold" grpId="0" nodeType="clickEffect">
+                                  <p:stCondLst>
+                                    <p:cond delay="0"/>
+                                  </p:stCondLst>
+                                  <p:childTnLst>
+                                    <p:set>
+                                      <p:cBhvr>
+                                        <p:cTn id="17" dur="1" fill="hold">
+                                          <p:stCondLst>
+                                            <p:cond delay="0"/>
+                                          </p:stCondLst>
+                                        </p:cTn>
+                                        <p:tgtEl>
+                                          <p:spTgt spid="3"/>
+                                        </p:tgtEl>
+                                        <p:attrNameLst>
+                                          <p:attrName>style.visibility</p:attrName>
+                                        </p:attrNameLst>
+                                      </p:cBhvr>
+                                      <p:to>
+                                        <p:strVal val="visible"/>
+                                      </p:to>
+                                    </p:set>
+                                  </p:childTnLst>
+                                </p:cTn>
+                              </p:par>
+                              <p:par>
+                                <p:cTn id="18" presetID="1" presetClass="exit" presetSubtype="0" fill="hold" nodeType="withEffect">
+                                  <p:stCondLst>
+                                    <p:cond delay="0"/>
+                                  </p:stCondLst>
+                                  <p:childTnLst>
+                                    <p:set>
+                                      <p:cBhvr>
+                                        <p:cTn id="19" dur="1" fill="hold">
+                                          <p:stCondLst>
+                                            <p:cond delay="0"/>
+                                          </p:stCondLst>
+                                        </p:cTn>
+                                        <p:tgtEl>
+                                          <p:spTgt spid="1028"/>
+                                        </p:tgtEl>
+                                        <p:attrNameLst>
+                                          <p:attrName>style.visibility</p:attrName>
+                                        </p:attrNameLst>
+                                      </p:cBhvr>
+                                      <p:to>
+                                        <p:strVal val="hidden"/>
+                                      </p:to>
+                                    </p:set>
+                                  </p:childTnLst>
+                                </p:cTn>
+                              </p:par>
+                            </p:childTnLst>
+                          </p:cTn>
+                        </p:par>
+                      </p:childTnLst>
+                    </p:cTn>
+                  </p:par>
+                  <p:par>
+                    <p:cTn id="20" fill="hold">
+                      <p:stCondLst>
+                        <p:cond delay="indefinite"/>
+                      </p:stCondLst>
+                      <p:childTnLst>
+                        <p:par>
+                          <p:cTn id="21" fill="hold">
+                            <p:stCondLst>
+                              <p:cond delay="0"/>
+                            </p:stCondLst>
+                            <p:childTnLst>
+                              <p:par>
+                                <p:cTn id="22" presetID="1" presetClass="entr" presetSubtype="0" fill="hold" nodeType="clickEffect">
+                                  <p:stCondLst>
+                                    <p:cond delay="0"/>
+                                  </p:stCondLst>
+                                  <p:childTnLst>
+                                    <p:set>
+                                      <p:cBhvr>
+                                        <p:cTn id="23" dur="1" fill="hold">
+                                          <p:stCondLst>
+                                            <p:cond delay="0"/>
+                                          </p:stCondLst>
+                                        </p:cTn>
+                                        <p:tgtEl>
+                                          <p:spTgt spid="1030"/>
+                                        </p:tgtEl>
+                                        <p:attrNameLst>
+                                          <p:attrName>style.visibility</p:attrName>
+                                        </p:attrNameLst>
+                                      </p:cBhvr>
+                                      <p:to>
+                                        <p:strVal val="visible"/>
+                                      </p:to>
+                                    </p:set>
+                                  </p:childTnLst>
+                                </p:cTn>
+                              </p:par>
+                              <p:par>
+                                <p:cTn id="24" presetID="1" presetClass="exit" presetSubtype="0" fill="hold" grpId="1" nodeType="withEffect">
+                                  <p:stCondLst>
+                                    <p:cond delay="0"/>
+                                  </p:stCondLst>
+                                  <p:childTnLst>
+                                    <p:set>
+                                      <p:cBhvr>
+                                        <p:cTn id="25" dur="1" fill="hold">
+                                          <p:stCondLst>
+                                            <p:cond delay="0"/>
+                                          </p:stCondLst>
+                                        </p:cTn>
+                                        <p:tgtEl>
+                                          <p:spTgt spid="3"/>
+                                        </p:tgtEl>
+                                        <p:attrNameLst>
+                                          <p:attrName>style.visibility</p:attrName>
+                                        </p:attrNameLst>
+                                      </p:cBhvr>
+                                      <p:to>
+                                        <p:strVal val="hidden"/>
+                                      </p:to>
+                                    </p:set>
+                                  </p:childTnLst>
+                                </p:cTn>
+                              </p:par>
+                              <p:par>
+                                <p:cTn id="26" presetID="1" presetClass="exit" presetSubtype="0" fill="hold" nodeType="withEffect">
+                                  <p:stCondLst>
+                                    <p:cond delay="0"/>
+                                  </p:stCondLst>
+                                  <p:childTnLst>
+                                    <p:set>
+                                      <p:cBhvr>
+                                        <p:cTn id="27" dur="1" fill="hold">
+                                          <p:stCondLst>
+                                            <p:cond delay="0"/>
+                                          </p:stCondLst>
+                                        </p:cTn>
+                                        <p:tgtEl>
+                                          <p:spTgt spid="1026"/>
+                                        </p:tgtEl>
+                                        <p:attrNameLst>
+                                          <p:attrName>style.visibility</p:attrName>
+                                        </p:attrNameLst>
+                                      </p:cBhvr>
+                                      <p:to>
+                                        <p:strVal val="hidden"/>
+                                      </p:to>
+                                    </p:set>
+                                  </p:childTnLst>
+                                </p:cTn>
+                              </p:par>
+                            </p:childTnLst>
+                          </p:cTn>
+                        </p:par>
+                      </p:childTnLst>
+                    </p:cTn>
+                  </p:par>
+                  <p:par>
+                    <p:cTn id="28" fill="hold">
+                      <p:stCondLst>
+                        <p:cond delay="indefinite"/>
+                      </p:stCondLst>
+                      <p:childTnLst>
+                        <p:par>
+                          <p:cTn id="29" fill="hold">
+                            <p:stCondLst>
+                              <p:cond delay="0"/>
+                            </p:stCondLst>
+                            <p:childTnLst>
+                              <p:par>
+                                <p:cTn id="30" presetID="1" presetClass="exit" presetSubtype="0" fill="hold" nodeType="clickEffect">
+                                  <p:stCondLst>
+                                    <p:cond delay="0"/>
+                                  </p:stCondLst>
+                                  <p:childTnLst>
+                                    <p:set>
+                                      <p:cBhvr>
+                                        <p:cTn id="31" dur="1" fill="hold">
+                                          <p:stCondLst>
+                                            <p:cond delay="0"/>
+                                          </p:stCondLst>
+                                        </p:cTn>
+                                        <p:tgtEl>
+                                          <p:spTgt spid="1030"/>
+                                        </p:tgtEl>
+                                        <p:attrNameLst>
+                                          <p:attrName>style.visibility</p:attrName>
+                                        </p:attrNameLst>
+                                      </p:cBhvr>
+                                      <p:to>
+                                        <p:strVal val="hidden"/>
+                                      </p:to>
+                                    </p:set>
+                                  </p:childTnLst>
+                                </p:cTn>
+                              </p:par>
+                              <p:par>
+                                <p:cTn id="32" presetID="42" presetClass="path" presetSubtype="0" accel="50000" decel="50000" fill="hold" grpId="1" nodeType="withEffect">
+                                  <p:stCondLst>
+                                    <p:cond delay="0"/>
+                                  </p:stCondLst>
+                                  <p:childTnLst>
+                                    <p:animMotion origin="layout" path="M 0.00351 -0.35 L 3.75E-6 3.33333E-6 " pathEditMode="relative" rAng="0" ptsTypes="AA">
+                                      <p:cBhvr>
+                                        <p:cTn id="33" dur="2000" fill="hold"/>
+                                        <p:tgtEl>
+                                          <p:spTgt spid="2"/>
+                                        </p:tgtEl>
+                                        <p:attrNameLst>
+                                          <p:attrName>ppt_x</p:attrName>
+                                          <p:attrName>ppt_y</p:attrName>
+                                        </p:attrNameLst>
+                                      </p:cBhvr>
+                                      <p:rCtr x="-182" y="16435"/>
+                                    </p:animMotion>
+                                  </p:childTnLst>
+                                </p:cTn>
+                              </p:par>
+                            </p:childTnLst>
+                          </p:cTn>
+                        </p:par>
+                      </p:childTnLst>
+                    </p:cTn>
+                  </p:par>
+                </p:childTnLst>
+              </p:cTn>
+              <p:prevCondLst>
+                <p:cond evt="onPrev" delay="0">
+                  <p:tgtEl>
+                    <p:sldTgt/>
+                  </p:tgtEl>
+                </p:cond>
+              </p:prevCondLst>
+              <p:nextCondLst>
+                <p:cond evt="onNext" delay="0">
+                  <p:tgtEl>
+                    <p:sldTgt/>
+                  </p:tgtEl>
+                </p:cond>
+              </p:nextCondLst>
+            </p:seq>
+          </p:childTnLst>
+        </p:cTn>
+      </p:par>
+    </p:tnLst>
+    <p:bldLst>
+      <p:bldP spid="3" grpId="0" animBg="1"/>
+      <p:bldP spid="3" grpId="1" animBg="1"/>
+      <p:bldP spid="2" grpId="0"/>
+      <p:bldP spid="2" grpId="1"/>
+    </p:bldLst>
+  </p:timing>
+</p:sld>
+</file>
+
+<file path=ppt/slides/slide3.xml><?xml version="1.0" encoding="utf-8"?>
 <p:sld xmlns:a="http://schemas.openxmlformats.org/drawingml/2006/main" xmlns:r="http://schemas.openxmlformats.org/officeDocument/2006/relationships" xmlns:p="http://schemas.openxmlformats.org/presentationml/2006/main">
   <p:cSld>
     <p:spTree>
@@ -23596,8 +24523,8 @@
         </p:nvSpPr>
         <p:spPr>
           <a:xfrm>
-            <a:off x="969818" y="678873"/>
-            <a:ext cx="10141527" cy="646331"/>
+            <a:off x="969818" y="648096"/>
+            <a:ext cx="10141527" cy="707886"/>
           </a:xfrm>
           <a:prstGeom prst="rect">
             <a:avLst/>
@@ -23612,10 +24539,14 @@
           <a:p>
             <a:pPr algn="ctr"/>
             <a:r>
-              <a:rPr lang="lv-LV" sz="3600" b="1" dirty="0"/>
+              <a:rPr lang="lv-LV" sz="4000" b="1" dirty="0">
+                <a:latin typeface="Bahnschrift" panose="020B0502040204020203" pitchFamily="34" charset="0"/>
+              </a:rPr>
               <a:t>Sazarojuma konstrukcija IF</a:t>
             </a:r>
-            <a:endParaRPr lang="ru-RU" sz="3600" b="1" dirty="0"/>
+            <a:endParaRPr lang="ru-RU" sz="4000" b="1" dirty="0">
+              <a:latin typeface="Bahnschrift" panose="020B0502040204020203" pitchFamily="34" charset="0"/>
+            </a:endParaRPr>
           </a:p>
         </p:txBody>
       </p:sp>
@@ -23873,10 +24804,17 @@
   <p:transition spd="slow">
     <p:push dir="u"/>
   </p:transition>
+  <p:timing>
+    <p:tnLst>
+      <p:par>
+        <p:cTn id="1" dur="indefinite" restart="never" nodeType="tmRoot"/>
+      </p:par>
+    </p:tnLst>
+  </p:timing>
 </p:sld>
 </file>
 
-<file path=ppt/slides/slide3.xml><?xml version="1.0" encoding="utf-8"?>
+<file path=ppt/slides/slide4.xml><?xml version="1.0" encoding="utf-8"?>
 <p:sld xmlns:a="http://schemas.openxmlformats.org/drawingml/2006/main" xmlns:r="http://schemas.openxmlformats.org/officeDocument/2006/relationships" xmlns:p="http://schemas.openxmlformats.org/presentationml/2006/main">
   <p:cSld>
     <p:spTree>
@@ -23933,7 +24871,7 @@
         </p:blipFill>
         <p:spPr>
           <a:xfrm>
-            <a:off x="332510" y="4973314"/>
+            <a:off x="346365" y="4973314"/>
             <a:ext cx="8675633" cy="651631"/>
           </a:xfrm>
           <a:prstGeom prst="rect">
@@ -23954,10 +24892,17 @@
   <p:transition spd="slow">
     <p:push dir="u"/>
   </p:transition>
+  <p:timing>
+    <p:tnLst>
+      <p:par>
+        <p:cTn id="1" dur="indefinite" restart="never" nodeType="tmRoot"/>
+      </p:par>
+    </p:tnLst>
+  </p:timing>
 </p:sld>
 </file>
 
-<file path=ppt/slides/slide4.xml><?xml version="1.0" encoding="utf-8"?>
+<file path=ppt/slides/slide5.xml><?xml version="1.0" encoding="utf-8"?>
 <p:sld xmlns:a="http://schemas.openxmlformats.org/drawingml/2006/main" xmlns:r="http://schemas.openxmlformats.org/officeDocument/2006/relationships" xmlns:p="http://schemas.openxmlformats.org/presentationml/2006/main">
   <p:cSld>
     <p:spTree>
@@ -23982,8 +24927,8 @@
         </p:nvSpPr>
         <p:spPr>
           <a:xfrm>
-            <a:off x="1066800" y="817419"/>
-            <a:ext cx="10141527" cy="646331"/>
+            <a:off x="1066800" y="786642"/>
+            <a:ext cx="10141527" cy="707886"/>
           </a:xfrm>
           <a:prstGeom prst="rect">
             <a:avLst/>
@@ -23998,10 +24943,20 @@
           <a:p>
             <a:pPr algn="ctr"/>
             <a:r>
-              <a:rPr lang="lv-LV" sz="3600" b="1" dirty="0"/>
-              <a:t>Sazarojuma konstrukcija IF ... else</a:t>
+              <a:rPr lang="lv-LV" sz="4000" b="1" dirty="0">
+                <a:latin typeface="Bahnschrift" panose="020B0502040204020203" pitchFamily="34" charset="0"/>
+              </a:rPr>
+              <a:t>Sazarojuma</a:t>
             </a:r>
-            <a:endParaRPr lang="ru-RU" sz="3600" b="1" dirty="0"/>
+            <a:r>
+              <a:rPr lang="lv-LV" sz="3600" b="1" dirty="0">
+                <a:latin typeface="Bahnschrift" panose="020B0502040204020203" pitchFamily="34" charset="0"/>
+              </a:rPr>
+              <a:t> konstrukcija IF ... else</a:t>
+            </a:r>
+            <a:endParaRPr lang="ru-RU" sz="3600" b="1" dirty="0">
+              <a:latin typeface="Bahnschrift" panose="020B0502040204020203" pitchFamily="34" charset="0"/>
+            </a:endParaRPr>
           </a:p>
         </p:txBody>
       </p:sp>
@@ -24013,8 +24968,8 @@
         </p:nvSpPr>
         <p:spPr>
           <a:xfrm>
-            <a:off x="2549236" y="3422072"/>
-            <a:ext cx="3463637" cy="1477328"/>
+            <a:off x="2078180" y="3864535"/>
+            <a:ext cx="8118763" cy="577850"/>
           </a:xfrm>
           <a:prstGeom prst="rect">
             <a:avLst/>
@@ -24027,7 +24982,7 @@
           </a:bodyPr>
           <a:lstStyle/>
           <a:p>
-            <a:pPr marL="342900" indent="-342900">
+            <a:pPr marL="342900" indent="-342900" algn="ctr">
               <a:lnSpc>
                 <a:spcPct val="150000"/>
               </a:lnSpc>
@@ -24035,7 +24990,7 @@
               <a:buChar char="•"/>
             </a:pPr>
             <a:r>
-              <a:rPr lang="lv-LV" sz="2000" dirty="0">
+              <a:rPr lang="lv-LV" sz="2400" dirty="0">
                 <a:solidFill>
                   <a:srgbClr val="C00000"/>
                 </a:solidFill>
@@ -24043,7 +24998,7 @@
               <a:t>if</a:t>
             </a:r>
             <a:r>
-              <a:rPr lang="lv-LV" sz="2000" dirty="0">
+              <a:rPr lang="lv-LV" sz="2400" dirty="0">
                 <a:solidFill>
                   <a:schemeClr val="tx1"/>
                 </a:solidFill>
@@ -24061,7 +25016,7 @@
         </p:nvSpPr>
         <p:spPr>
           <a:xfrm>
-            <a:off x="6691744" y="2587264"/>
+            <a:off x="4710544" y="2587263"/>
             <a:ext cx="2854037" cy="3847207"/>
           </a:xfrm>
           <a:prstGeom prst="rect">
@@ -24228,10 +25183,116 @@
   <p:transition spd="slow">
     <p:push dir="u"/>
   </p:transition>
+  <p:timing>
+    <p:tnLst>
+      <p:par>
+        <p:cTn id="1" dur="indefinite" restart="never" nodeType="tmRoot">
+          <p:childTnLst>
+            <p:seq concurrent="1" nextAc="seek">
+              <p:cTn id="2" dur="indefinite" nodeType="mainSeq">
+                <p:childTnLst>
+                  <p:par>
+                    <p:cTn id="3" fill="hold">
+                      <p:stCondLst>
+                        <p:cond delay="indefinite"/>
+                      </p:stCondLst>
+                      <p:childTnLst>
+                        <p:par>
+                          <p:cTn id="4" fill="hold">
+                            <p:stCondLst>
+                              <p:cond delay="0"/>
+                            </p:stCondLst>
+                            <p:childTnLst>
+                              <p:par>
+                                <p:cTn id="5" presetID="1" presetClass="entr" presetSubtype="0" fill="hold" grpId="0" nodeType="clickEffect">
+                                  <p:stCondLst>
+                                    <p:cond delay="0"/>
+                                  </p:stCondLst>
+                                  <p:childTnLst>
+                                    <p:set>
+                                      <p:cBhvr>
+                                        <p:cTn id="6" dur="1" fill="hold">
+                                          <p:stCondLst>
+                                            <p:cond delay="0"/>
+                                          </p:stCondLst>
+                                        </p:cTn>
+                                        <p:tgtEl>
+                                          <p:spTgt spid="5"/>
+                                        </p:tgtEl>
+                                        <p:attrNameLst>
+                                          <p:attrName>style.visibility</p:attrName>
+                                        </p:attrNameLst>
+                                      </p:cBhvr>
+                                      <p:to>
+                                        <p:strVal val="visible"/>
+                                      </p:to>
+                                    </p:set>
+                                  </p:childTnLst>
+                                </p:cTn>
+                              </p:par>
+                              <p:par>
+                                <p:cTn id="7" presetID="1" presetClass="exit" presetSubtype="0" fill="hold" grpId="0" nodeType="withEffect">
+                                  <p:stCondLst>
+                                    <p:cond delay="0"/>
+                                  </p:stCondLst>
+                                  <p:childTnLst>
+                                    <p:set>
+                                      <p:cBhvr>
+                                        <p:cTn id="8" dur="1" fill="hold">
+                                          <p:stCondLst>
+                                            <p:cond delay="0"/>
+                                          </p:stCondLst>
+                                        </p:cTn>
+                                        <p:tgtEl>
+                                          <p:spTgt spid="4"/>
+                                        </p:tgtEl>
+                                        <p:attrNameLst>
+                                          <p:attrName>style.visibility</p:attrName>
+                                        </p:attrNameLst>
+                                      </p:cBhvr>
+                                      <p:to>
+                                        <p:strVal val="hidden"/>
+                                      </p:to>
+                                    </p:set>
+                                  </p:childTnLst>
+                                </p:cTn>
+                              </p:par>
+                            </p:childTnLst>
+                          </p:cTn>
+                        </p:par>
+                      </p:childTnLst>
+                    </p:cTn>
+                  </p:par>
+                </p:childTnLst>
+              </p:cTn>
+              <p:prevCondLst>
+                <p:cond evt="onPrev" delay="0">
+                  <p:tgtEl>
+                    <p:sldTgt/>
+                  </p:tgtEl>
+                </p:cond>
+              </p:prevCondLst>
+              <p:nextCondLst>
+                <p:cond evt="onNext" delay="0">
+                  <p:tgtEl>
+                    <p:sldTgt/>
+                  </p:tgtEl>
+                </p:cond>
+              </p:nextCondLst>
+            </p:seq>
+          </p:childTnLst>
+        </p:cTn>
+      </p:par>
+    </p:tnLst>
+    <p:bldLst>
+      <p:bldP spid="4" grpId="0"/>
+      <p:bldP spid="5" grpId="0"/>
+    </p:bldLst>
+  </p:timing>
 </p:sld>
 </file>
 
-<file path=ppt/slides/slide5.xml><?xml version="1.0" encoding="utf-8"?>
+<file path=ppt/slides/slide6.xml><?xml version="1.0" encoding="utf-8"?>
 <p:sld xmlns:a="http://schemas.openxmlformats.org/drawingml/2006/main" xmlns:r="http://schemas.openxmlformats.org/officeDocument/2006/relationships" xmlns:p="http://schemas.openxmlformats.org/presentationml/2006/main">
   <p:cSld>
     <p:spTree>
@@ -24304,10 +25365,17 @@
   <p:transition spd="slow">
     <p:push dir="u"/>
   </p:transition>
+  <p:timing>
+    <p:tnLst>
+      <p:par>
+        <p:cTn id="1" dur="indefinite" restart="never" nodeType="tmRoot"/>
+      </p:par>
+    </p:tnLst>
+  </p:timing>
 </p:sld>
 </file>
 
-<file path=ppt/slides/slide6.xml><?xml version="1.0" encoding="utf-8"?>
+<file path=ppt/slides/slide7.xml><?xml version="1.0" encoding="utf-8"?>
 <p:sld xmlns:a="http://schemas.openxmlformats.org/drawingml/2006/main" xmlns:r="http://schemas.openxmlformats.org/officeDocument/2006/relationships" xmlns:p="http://schemas.openxmlformats.org/presentationml/2006/main">
   <p:cSld>
     <p:spTree>
@@ -24586,7 +25654,7 @@
 </p:sld>
 </file>
 
-<file path=ppt/slides/slide7.xml><?xml version="1.0" encoding="utf-8"?>
+<file path=ppt/slides/slide8.xml><?xml version="1.0" encoding="utf-8"?>
 <p:sld xmlns:a="http://schemas.openxmlformats.org/drawingml/2006/main" xmlns:r="http://schemas.openxmlformats.org/officeDocument/2006/relationships" xmlns:p="http://schemas.openxmlformats.org/presentationml/2006/main">
   <p:cSld>
     <p:spTree>
@@ -24642,8 +25710,8 @@
         </p:nvSpPr>
         <p:spPr>
           <a:xfrm>
-            <a:off x="2452256" y="3092770"/>
-            <a:ext cx="7744690" cy="2677656"/>
+            <a:off x="2341420" y="2992582"/>
+            <a:ext cx="8423562" cy="2777843"/>
           </a:xfrm>
           <a:prstGeom prst="rect">
             <a:avLst/>
@@ -24651,7 +25719,7 @@
           <a:noFill/>
         </p:spPr>
         <p:txBody>
-          <a:bodyPr wrap="square" rtlCol="0">
+          <a:bodyPr wrap="square" rtlCol="0" anchor="ctr">
             <a:spAutoFit/>
           </a:bodyPr>
           <a:lstStyle/>
@@ -24708,74 +25776,6 @@
           </a:p>
         </p:txBody>
       </p:sp>
-      <p:sp>
-        <p:nvSpPr>
-          <p:cNvPr id="6" name="TextBox 5"/>
-          <p:cNvSpPr txBox="1"/>
-          <p:nvPr/>
-        </p:nvSpPr>
-        <p:spPr>
-          <a:xfrm>
-            <a:off x="3075711" y="3277436"/>
-            <a:ext cx="7744690" cy="2308324"/>
-          </a:xfrm>
-          <a:prstGeom prst="rect">
-            <a:avLst/>
-          </a:prstGeom>
-          <a:noFill/>
-        </p:spPr>
-        <p:txBody>
-          <a:bodyPr wrap="square" rtlCol="0">
-            <a:spAutoFit/>
-          </a:bodyPr>
-          <a:lstStyle/>
-          <a:p>
-            <a:r>
-              <a:rPr lang="lv-LV" sz="2400" dirty="0">
-                <a:solidFill>
-                  <a:srgbClr val="C00000"/>
-                </a:solidFill>
-              </a:rPr>
-              <a:t>switch</a:t>
-            </a:r>
-            <a:r>
-              <a:rPr lang="lv-LV" sz="2400" dirty="0"/>
-              <a:t> (n) {</a:t>
-            </a:r>
-          </a:p>
-          <a:p>
-            <a:r>
-              <a:rPr lang="lv-LV" sz="2400" dirty="0"/>
-              <a:t>     case 0: System.out.println(«viens»); break;</a:t>
-            </a:r>
-          </a:p>
-          <a:p>
-            <a:r>
-              <a:rPr lang="lv-LV" sz="2400" dirty="0"/>
-              <a:t>     case 1: System.out.println(«divi»); break;</a:t>
-            </a:r>
-          </a:p>
-          <a:p>
-            <a:r>
-              <a:rPr lang="lv-LV" sz="2400" dirty="0"/>
-              <a:t>     case 2: System.out.println(«trīs»); break;</a:t>
-            </a:r>
-          </a:p>
-          <a:p>
-            <a:r>
-              <a:rPr lang="lv-LV" sz="2400" dirty="0"/>
-              <a:t>     default :System.out.println(«Kļūda!»);</a:t>
-            </a:r>
-          </a:p>
-          <a:p>
-            <a:r>
-              <a:rPr lang="lv-LV" sz="2400" dirty="0"/>
-              <a:t>}</a:t>
-            </a:r>
-            <a:endParaRPr lang="ru-RU" sz="2400" dirty="0"/>
-          </a:p>
-        </p:txBody>
-      </p:sp>
     </p:spTree>
     <p:extLst>
       <p:ext uri="{BB962C8B-B14F-4D97-AF65-F5344CB8AC3E}">
@@ -24792,113 +25792,14 @@
   <p:timing>
     <p:tnLst>
       <p:par>
-        <p:cTn id="1" dur="indefinite" restart="never" nodeType="tmRoot">
-          <p:childTnLst>
-            <p:seq concurrent="1" nextAc="seek">
-              <p:cTn id="2" dur="indefinite" nodeType="mainSeq">
-                <p:childTnLst>
-                  <p:par>
-                    <p:cTn id="3" fill="hold">
-                      <p:stCondLst>
-                        <p:cond delay="indefinite"/>
-                      </p:stCondLst>
-                      <p:childTnLst>
-                        <p:par>
-                          <p:cTn id="4" fill="hold">
-                            <p:stCondLst>
-                              <p:cond delay="0"/>
-                            </p:stCondLst>
-                            <p:childTnLst>
-                              <p:par>
-                                <p:cTn id="5" presetID="1" presetClass="exit" presetSubtype="0" fill="hold" grpId="0" nodeType="clickEffect">
-                                  <p:stCondLst>
-                                    <p:cond delay="0"/>
-                                  </p:stCondLst>
-                                  <p:childTnLst>
-                                    <p:set>
-                                      <p:cBhvr>
-                                        <p:cTn id="6" dur="1" fill="hold">
-                                          <p:stCondLst>
-                                            <p:cond delay="0"/>
-                                          </p:stCondLst>
-                                        </p:cTn>
-                                        <p:tgtEl>
-                                          <p:spTgt spid="5"/>
-                                        </p:tgtEl>
-                                        <p:attrNameLst>
-                                          <p:attrName>style.visibility</p:attrName>
-                                        </p:attrNameLst>
-                                      </p:cBhvr>
-                                      <p:to>
-                                        <p:strVal val="hidden"/>
-                                      </p:to>
-                                    </p:set>
-                                  </p:childTnLst>
-                                </p:cTn>
-                              </p:par>
-                              <p:par>
-                                <p:cTn id="7" presetID="1" presetClass="entr" presetSubtype="0" fill="hold" grpId="0" nodeType="withEffect">
-                                  <p:stCondLst>
-                                    <p:cond delay="0"/>
-                                  </p:stCondLst>
-                                  <p:childTnLst>
-                                    <p:set>
-                                      <p:cBhvr>
-                                        <p:cTn id="8" dur="1" fill="hold">
-                                          <p:stCondLst>
-                                            <p:cond delay="0"/>
-                                          </p:stCondLst>
-                                        </p:cTn>
-                                        <p:tgtEl>
-                                          <p:spTgt spid="6"/>
-                                        </p:tgtEl>
-                                        <p:attrNameLst>
-                                          <p:attrName>style.visibility</p:attrName>
-                                        </p:attrNameLst>
-                                      </p:cBhvr>
-                                      <p:to>
-                                        <p:strVal val="visible"/>
-                                      </p:to>
-                                    </p:set>
-                                  </p:childTnLst>
-                                </p:cTn>
-                              </p:par>
-                            </p:childTnLst>
-                          </p:cTn>
-                        </p:par>
-                      </p:childTnLst>
-                    </p:cTn>
-                  </p:par>
-                </p:childTnLst>
-              </p:cTn>
-              <p:prevCondLst>
-                <p:cond evt="onPrev" delay="0">
-                  <p:tgtEl>
-                    <p:sldTgt/>
-                  </p:tgtEl>
-                </p:cond>
-              </p:prevCondLst>
-              <p:nextCondLst>
-                <p:cond evt="onNext" delay="0">
-                  <p:tgtEl>
-                    <p:sldTgt/>
-                  </p:tgtEl>
-                </p:cond>
-              </p:nextCondLst>
-            </p:seq>
-          </p:childTnLst>
-        </p:cTn>
+        <p:cTn id="1" dur="indefinite" restart="never" nodeType="tmRoot"/>
       </p:par>
     </p:tnLst>
-    <p:bldLst>
-      <p:bldP spid="5" grpId="0"/>
-      <p:bldP spid="6" grpId="0"/>
-    </p:bldLst>
   </p:timing>
 </p:sld>
 </file>
 
-<file path=ppt/slides/slide8.xml><?xml version="1.0" encoding="utf-8"?>
+<file path=ppt/slides/slide9.xml><?xml version="1.0" encoding="utf-8"?>
 <p:sld xmlns:a="http://schemas.openxmlformats.org/drawingml/2006/main" xmlns:r="http://schemas.openxmlformats.org/officeDocument/2006/relationships" xmlns:p="http://schemas.openxmlformats.org/presentationml/2006/main">
   <p:cSld>
     <p:spTree>
@@ -25134,87 +26035,6 @@
       </p:par>
     </p:tnLst>
   </p:timing>
-</p:sld>
-</file>
-
-<file path=ppt/slides/slide9.xml><?xml version="1.0" encoding="utf-8"?>
-<p:sld xmlns:a="http://schemas.openxmlformats.org/drawingml/2006/main" xmlns:r="http://schemas.openxmlformats.org/officeDocument/2006/relationships" xmlns:p="http://schemas.openxmlformats.org/presentationml/2006/main">
-  <p:cSld>
-    <p:spTree>
-      <p:nvGrpSpPr>
-        <p:cNvPr id="1" name="Shape 692"/>
-        <p:cNvGrpSpPr/>
-        <p:nvPr/>
-      </p:nvGrpSpPr>
-      <p:grpSpPr>
-        <a:xfrm>
-          <a:off x="0" y="0"/>
-          <a:ext cx="0" cy="0"/>
-          <a:chOff x="0" y="0"/>
-          <a:chExt cx="0" cy="0"/>
-        </a:xfrm>
-      </p:grpSpPr>
-      <p:pic>
-        <p:nvPicPr>
-          <p:cNvPr id="2" name="Рисунок 1"/>
-          <p:cNvPicPr>
-            <a:picLocks noChangeAspect="1"/>
-          </p:cNvPicPr>
-          <p:nvPr/>
-        </p:nvPicPr>
-        <p:blipFill>
-          <a:blip r:embed="rId3"/>
-          <a:stretch>
-            <a:fillRect/>
-          </a:stretch>
-        </p:blipFill>
-        <p:spPr>
-          <a:xfrm>
-            <a:off x="581890" y="901750"/>
-            <a:ext cx="7863701" cy="5360505"/>
-          </a:xfrm>
-          <a:prstGeom prst="rect">
-            <a:avLst/>
-          </a:prstGeom>
-        </p:spPr>
-      </p:pic>
-      <p:pic>
-        <p:nvPicPr>
-          <p:cNvPr id="3" name="Рисунок 2"/>
-          <p:cNvPicPr>
-            <a:picLocks noChangeAspect="1"/>
-          </p:cNvPicPr>
-          <p:nvPr/>
-        </p:nvPicPr>
-        <p:blipFill>
-          <a:blip r:embed="rId4"/>
-          <a:stretch>
-            <a:fillRect/>
-          </a:stretch>
-        </p:blipFill>
-        <p:spPr>
-          <a:xfrm>
-            <a:off x="8543343" y="3114690"/>
-            <a:ext cx="3285784" cy="934623"/>
-          </a:xfrm>
-          <a:prstGeom prst="rect">
-            <a:avLst/>
-          </a:prstGeom>
-        </p:spPr>
-      </p:pic>
-    </p:spTree>
-    <p:extLst>
-      <p:ext uri="{BB962C8B-B14F-4D97-AF65-F5344CB8AC3E}">
-        <p14:creationId xmlns:p14="http://schemas.microsoft.com/office/powerpoint/2010/main" val="2874742192"/>
-      </p:ext>
-    </p:extLst>
-  </p:cSld>
-  <p:clrMapOvr>
-    <a:masterClrMapping/>
-  </p:clrMapOvr>
-  <p:transition spd="slow">
-    <p:push dir="u"/>
-  </p:transition>
 </p:sld>
 </file>
 

</xml_diff>

<commit_message>
Pārstrādāta test metode un labota klasu diagramma
</commit_message>
<xml_diff>
--- a/prezentacija un uml/Kraine_Sazarojuma-konstrukcijas.pptx
+++ b/prezentacija un uml/Kraine_Sazarojuma-konstrukcijas.pptx
@@ -26,23 +26,23 @@
   <p:notesSz cx="6858000" cy="9144000"/>
   <p:embeddedFontLst>
     <p:embeddedFont>
-      <p:font typeface="Ubuntu" panose="020B0604020202020204" charset="0"/>
+      <p:font typeface="Calibri" panose="020F0502020204030204" pitchFamily="34" charset="0"/>
       <p:regular r:id="rId16"/>
       <p:bold r:id="rId17"/>
       <p:italic r:id="rId18"/>
       <p:boldItalic r:id="rId19"/>
     </p:embeddedFont>
     <p:embeddedFont>
-      <p:font typeface="Calibri" panose="020F0502020204030204" pitchFamily="34" charset="0"/>
+      <p:font typeface="Bahnschrift" panose="020B0502040204020203" pitchFamily="34" charset="0"/>
       <p:regular r:id="rId20"/>
       <p:bold r:id="rId21"/>
-      <p:italic r:id="rId22"/>
-      <p:boldItalic r:id="rId23"/>
     </p:embeddedFont>
     <p:embeddedFont>
-      <p:font typeface="Bahnschrift" panose="020B0502040204020203" pitchFamily="34" charset="0"/>
-      <p:regular r:id="rId24"/>
-      <p:bold r:id="rId25"/>
+      <p:font typeface="Ubuntu" panose="020B0604020202020204" charset="0"/>
+      <p:regular r:id="rId22"/>
+      <p:bold r:id="rId23"/>
+      <p:italic r:id="rId24"/>
+      <p:boldItalic r:id="rId25"/>
     </p:embeddedFont>
   </p:embeddedFontLst>
   <p:defaultTextStyle>
@@ -23487,7 +23487,7 @@
         <p:spPr>
           <a:xfrm>
             <a:off x="789709" y="1454728"/>
-            <a:ext cx="10709564" cy="3170099"/>
+            <a:ext cx="10709564" cy="3477875"/>
           </a:xfrm>
           <a:prstGeom prst="rect">
             <a:avLst/>
@@ -23647,7 +23647,7 @@
                 <a:hlinkClick r:id="rId5">
                   <a:extLst>
                     <a:ext uri="{A12FA001-AC4F-418D-AE19-62706E023703}">
-                      <ahyp:hlinkClr xmlns:ahyp="http://schemas.microsoft.com/office/drawing/2018/hyperlinkcolor" xmlns="" val="tx"/>
+                      <ahyp:hlinkClr xmlns="" xmlns:ahyp="http://schemas.microsoft.com/office/drawing/2018/hyperlinkcolor" val="tx"/>
                     </a:ext>
                   </a:extLst>
                 </a:hlinkClick>
@@ -23661,7 +23661,7 @@
               <a:hlinkClick r:id="rId5">
                 <a:extLst>
                   <a:ext uri="{A12FA001-AC4F-418D-AE19-62706E023703}">
-                    <ahyp:hlinkClr xmlns:ahyp="http://schemas.microsoft.com/office/drawing/2018/hyperlinkcolor" xmlns="" val="tx"/>
+                    <ahyp:hlinkClr xmlns="" xmlns:ahyp="http://schemas.microsoft.com/office/drawing/2018/hyperlinkcolor" val="tx"/>
                   </a:ext>
                 </a:extLst>
               </a:hlinkClick>
@@ -23677,7 +23677,7 @@
                 <a:hlinkClick r:id="rId6">
                   <a:extLst>
                     <a:ext uri="{A12FA001-AC4F-418D-AE19-62706E023703}">
-                      <ahyp:hlinkClr xmlns:ahyp="http://schemas.microsoft.com/office/drawing/2018/hyperlinkcolor" xmlns="" val="tx"/>
+                      <ahyp:hlinkClr xmlns="" xmlns:ahyp="http://schemas.microsoft.com/office/drawing/2018/hyperlinkcolor" val="tx"/>
                     </a:ext>
                   </a:extLst>
                 </a:hlinkClick>
@@ -23698,8 +23698,57 @@
                   <a:schemeClr val="bg2"/>
                 </a:solidFill>
               </a:rPr>
-              <a:t>Iepriekšēji darbi Java valodā</a:t>
+              <a:t>Iepriekšēji darbi Java </a:t>
             </a:r>
+            <a:r>
+              <a:rPr lang="lv-LV" sz="2000" dirty="0" smtClean="0">
+                <a:solidFill>
+                  <a:schemeClr val="bg2"/>
+                </a:solidFill>
+              </a:rPr>
+              <a:t>valodā</a:t>
+            </a:r>
+          </a:p>
+          <a:p>
+            <a:r>
+              <a:rPr lang="lv-LV" sz="2000" dirty="0">
+                <a:solidFill>
+                  <a:schemeClr val="bg2"/>
+                </a:solidFill>
+                <a:hlinkClick r:id="rId7"/>
+              </a:rPr>
+              <a:t>https://</a:t>
+            </a:r>
+            <a:r>
+              <a:rPr lang="lv-LV" sz="2000" dirty="0" smtClean="0">
+                <a:solidFill>
+                  <a:schemeClr val="bg2"/>
+                </a:solidFill>
+                <a:hlinkClick r:id="rId7"/>
+              </a:rPr>
+              <a:t>chat.forefront.ai</a:t>
+            </a:r>
+            <a:r>
+              <a:rPr lang="lv-LV" sz="2000" dirty="0">
+                <a:solidFill>
+                  <a:schemeClr val="bg2"/>
+                </a:solidFill>
+              </a:rPr>
+              <a:t> (cik jautājumi atbildēti pareizi ar pirmo </a:t>
+            </a:r>
+            <a:r>
+              <a:rPr lang="lv-LV" sz="2000" dirty="0" smtClean="0">
+                <a:solidFill>
+                  <a:schemeClr val="bg2"/>
+                </a:solidFill>
+              </a:rPr>
+              <a:t>reizi)</a:t>
+            </a:r>
+            <a:endParaRPr lang="lv-LV" sz="2000" dirty="0">
+              <a:solidFill>
+                <a:schemeClr val="bg2"/>
+              </a:solidFill>
+            </a:endParaRPr>
           </a:p>
           <a:p>
             <a:endParaRPr lang="lv-LV" sz="2000" dirty="0">

</xml_diff>